<commit_message>
update image and favicon
</commit_message>
<xml_diff>
--- a/src/assets/images/favicon.pptx
+++ b/src/assets/images/favicon.pptx
@@ -104,6 +104,11 @@
       </a:defRPr>
     </a:lvl9pPr>
   </p:defaultTextStyle>
+  <p:extLst>
+    <p:ext uri="{EFAFB233-063F-42B5-8137-9DF3F51BA10A}">
+      <p15:sldGuideLst xmlns:p15="http://schemas.microsoft.com/office/powerpoint/2012/main"/>
+    </p:ext>
+  </p:extLst>
 </p:presentation>
 </file>
 
@@ -238,7 +243,7 @@
           <a:p>
             <a:fld id="{6D9BB06A-AD5F-E34F-8144-03B5E39C5402}" type="datetimeFigureOut">
               <a:rPr lang="en-US" smtClean="0"/>
-              <a:t>7/17/24</a:t>
+              <a:t>7/18/24</a:t>
             </a:fld>
             <a:endParaRPr lang="en-US"/>
           </a:p>
@@ -408,7 +413,7 @@
           <a:p>
             <a:fld id="{6D9BB06A-AD5F-E34F-8144-03B5E39C5402}" type="datetimeFigureOut">
               <a:rPr lang="en-US" smtClean="0"/>
-              <a:t>7/17/24</a:t>
+              <a:t>7/18/24</a:t>
             </a:fld>
             <a:endParaRPr lang="en-US"/>
           </a:p>
@@ -588,7 +593,7 @@
           <a:p>
             <a:fld id="{6D9BB06A-AD5F-E34F-8144-03B5E39C5402}" type="datetimeFigureOut">
               <a:rPr lang="en-US" smtClean="0"/>
-              <a:t>7/17/24</a:t>
+              <a:t>7/18/24</a:t>
             </a:fld>
             <a:endParaRPr lang="en-US"/>
           </a:p>
@@ -758,7 +763,7 @@
           <a:p>
             <a:fld id="{6D9BB06A-AD5F-E34F-8144-03B5E39C5402}" type="datetimeFigureOut">
               <a:rPr lang="en-US" smtClean="0"/>
-              <a:t>7/17/24</a:t>
+              <a:t>7/18/24</a:t>
             </a:fld>
             <a:endParaRPr lang="en-US"/>
           </a:p>
@@ -1004,7 +1009,7 @@
           <a:p>
             <a:fld id="{6D9BB06A-AD5F-E34F-8144-03B5E39C5402}" type="datetimeFigureOut">
               <a:rPr lang="en-US" smtClean="0"/>
-              <a:t>7/17/24</a:t>
+              <a:t>7/18/24</a:t>
             </a:fld>
             <a:endParaRPr lang="en-US"/>
           </a:p>
@@ -1236,7 +1241,7 @@
           <a:p>
             <a:fld id="{6D9BB06A-AD5F-E34F-8144-03B5E39C5402}" type="datetimeFigureOut">
               <a:rPr lang="en-US" smtClean="0"/>
-              <a:t>7/17/24</a:t>
+              <a:t>7/18/24</a:t>
             </a:fld>
             <a:endParaRPr lang="en-US"/>
           </a:p>
@@ -1603,7 +1608,7 @@
           <a:p>
             <a:fld id="{6D9BB06A-AD5F-E34F-8144-03B5E39C5402}" type="datetimeFigureOut">
               <a:rPr lang="en-US" smtClean="0"/>
-              <a:t>7/17/24</a:t>
+              <a:t>7/18/24</a:t>
             </a:fld>
             <a:endParaRPr lang="en-US"/>
           </a:p>
@@ -1721,7 +1726,7 @@
           <a:p>
             <a:fld id="{6D9BB06A-AD5F-E34F-8144-03B5E39C5402}" type="datetimeFigureOut">
               <a:rPr lang="en-US" smtClean="0"/>
-              <a:t>7/17/24</a:t>
+              <a:t>7/18/24</a:t>
             </a:fld>
             <a:endParaRPr lang="en-US"/>
           </a:p>
@@ -1816,7 +1821,7 @@
           <a:p>
             <a:fld id="{6D9BB06A-AD5F-E34F-8144-03B5E39C5402}" type="datetimeFigureOut">
               <a:rPr lang="en-US" smtClean="0"/>
-              <a:t>7/17/24</a:t>
+              <a:t>7/18/24</a:t>
             </a:fld>
             <a:endParaRPr lang="en-US"/>
           </a:p>
@@ -2093,7 +2098,7 @@
           <a:p>
             <a:fld id="{6D9BB06A-AD5F-E34F-8144-03B5E39C5402}" type="datetimeFigureOut">
               <a:rPr lang="en-US" smtClean="0"/>
-              <a:t>7/17/24</a:t>
+              <a:t>7/18/24</a:t>
             </a:fld>
             <a:endParaRPr lang="en-US"/>
           </a:p>
@@ -2350,7 +2355,7 @@
           <a:p>
             <a:fld id="{6D9BB06A-AD5F-E34F-8144-03B5E39C5402}" type="datetimeFigureOut">
               <a:rPr lang="en-US" smtClean="0"/>
-              <a:t>7/17/24</a:t>
+              <a:t>7/18/24</a:t>
             </a:fld>
             <a:endParaRPr lang="en-US"/>
           </a:p>
@@ -2563,7 +2568,7 @@
           <a:p>
             <a:fld id="{6D9BB06A-AD5F-E34F-8144-03B5E39C5402}" type="datetimeFigureOut">
               <a:rPr lang="en-US" smtClean="0"/>
-              <a:t>7/17/24</a:t>
+              <a:t>7/18/24</a:t>
             </a:fld>
             <a:endParaRPr lang="en-US"/>
           </a:p>
@@ -2984,14 +2989,14 @@
         </p:nvSpPr>
         <p:spPr>
           <a:xfrm>
-            <a:off x="99740" y="90365"/>
+            <a:off x="103845" y="103845"/>
             <a:ext cx="4472260" cy="4472260"/>
           </a:xfrm>
           <a:prstGeom prst="ellipse">
             <a:avLst/>
           </a:prstGeom>
           <a:solidFill>
-            <a:schemeClr val="accent6"/>
+            <a:srgbClr val="00B0F0"/>
           </a:solidFill>
           <a:ln>
             <a:noFill/>
@@ -3036,7 +3041,7 @@
         </p:nvSpPr>
         <p:spPr>
           <a:xfrm rot="5400000">
-            <a:off x="2211328" y="-198497"/>
+            <a:off x="2082798" y="31298"/>
             <a:ext cx="514353" cy="3102097"/>
           </a:xfrm>
           <a:prstGeom prst="rect">
@@ -3076,10 +3081,10 @@
       </p:sp>
       <p:sp>
         <p:nvSpPr>
-          <p:cNvPr id="13" name="Rectangle 12">
+          <p:cNvPr id="14" name="Rectangle 13">
             <a:extLst>
               <a:ext uri="{FF2B5EF4-FFF2-40B4-BE49-F238E27FC236}">
-                <a16:creationId xmlns:a16="http://schemas.microsoft.com/office/drawing/2014/main" id="{7426FA5A-0F50-4750-9FB4-EF1B51B1074B}"/>
+                <a16:creationId xmlns:a16="http://schemas.microsoft.com/office/drawing/2014/main" id="{02435E20-4162-864A-DEC5-C445EAAF3E6D}"/>
               </a:ext>
             </a:extLst>
           </p:cNvPr>
@@ -3088,8 +3093,8 @@
         </p:nvSpPr>
         <p:spPr>
           <a:xfrm rot="5400000">
-            <a:off x="1916409" y="832956"/>
-            <a:ext cx="514353" cy="2491778"/>
+            <a:off x="1667646" y="1318190"/>
+            <a:ext cx="514353" cy="2271793"/>
           </a:xfrm>
           <a:prstGeom prst="rect">
             <a:avLst/>
@@ -3128,58 +3133,6 @@
       </p:sp>
       <p:sp>
         <p:nvSpPr>
-          <p:cNvPr id="14" name="Rectangle 13">
-            <a:extLst>
-              <a:ext uri="{FF2B5EF4-FFF2-40B4-BE49-F238E27FC236}">
-                <a16:creationId xmlns:a16="http://schemas.microsoft.com/office/drawing/2014/main" id="{02435E20-4162-864A-DEC5-C445EAAF3E6D}"/>
-              </a:ext>
-            </a:extLst>
-          </p:cNvPr>
-          <p:cNvSpPr/>
-          <p:nvPr/>
-        </p:nvSpPr>
-        <p:spPr>
-          <a:xfrm rot="5400000">
-            <a:off x="1573509" y="1959401"/>
-            <a:ext cx="514353" cy="1805978"/>
-          </a:xfrm>
-          <a:prstGeom prst="rect">
-            <a:avLst/>
-          </a:prstGeom>
-          <a:solidFill>
-            <a:schemeClr val="tx1"/>
-          </a:solidFill>
-          <a:ln>
-            <a:noFill/>
-          </a:ln>
-        </p:spPr>
-        <p:style>
-          <a:lnRef idx="2">
-            <a:schemeClr val="accent1">
-              <a:shade val="15000"/>
-            </a:schemeClr>
-          </a:lnRef>
-          <a:fillRef idx="1">
-            <a:schemeClr val="accent1"/>
-          </a:fillRef>
-          <a:effectRef idx="0">
-            <a:schemeClr val="accent1"/>
-          </a:effectRef>
-          <a:fontRef idx="minor">
-            <a:schemeClr val="lt1"/>
-          </a:fontRef>
-        </p:style>
-        <p:txBody>
-          <a:bodyPr rtlCol="0" anchor="ctr"/>
-          <a:lstStyle/>
-          <a:p>
-            <a:pPr algn="ctr"/>
-            <a:endParaRPr lang="en-US" sz="1456"/>
-          </a:p>
-        </p:txBody>
-      </p:sp>
-      <p:sp>
-        <p:nvSpPr>
           <p:cNvPr id="15" name="Rectangle 14">
             <a:extLst>
               <a:ext uri="{FF2B5EF4-FFF2-40B4-BE49-F238E27FC236}">
@@ -3192,7 +3145,7 @@
         </p:nvSpPr>
         <p:spPr>
           <a:xfrm rot="5400000">
-            <a:off x="1321097" y="2938106"/>
+            <a:off x="1182326" y="2675250"/>
             <a:ext cx="514353" cy="1301153"/>
           </a:xfrm>
           <a:prstGeom prst="rect">

</xml_diff>